<commit_message>
minor fix to documentation
</commit_message>
<xml_diff>
--- a/docs/hochschule_schmalkalden/antrag_auf_ausgabe_der_batchelorarbeit.pptx
+++ b/docs/hochschule_schmalkalden/antrag_auf_ausgabe_der_batchelorarbeit.pptx
@@ -243,7 +243,7 @@
           <a:p>
             <a:fld id="{0B7B8FCF-5140-490E-ADF7-11AFBA6DDAE6}" type="datetimeFigureOut">
               <a:rPr lang="en-US" smtClean="0"/>
-              <a:t>9/14/2025</a:t>
+              <a:t>9/17/2025</a:t>
             </a:fld>
             <a:endParaRPr lang="en-US"/>
           </a:p>
@@ -413,7 +413,7 @@
           <a:p>
             <a:fld id="{0B7B8FCF-5140-490E-ADF7-11AFBA6DDAE6}" type="datetimeFigureOut">
               <a:rPr lang="en-US" smtClean="0"/>
-              <a:t>9/14/2025</a:t>
+              <a:t>9/17/2025</a:t>
             </a:fld>
             <a:endParaRPr lang="en-US"/>
           </a:p>
@@ -593,7 +593,7 @@
           <a:p>
             <a:fld id="{0B7B8FCF-5140-490E-ADF7-11AFBA6DDAE6}" type="datetimeFigureOut">
               <a:rPr lang="en-US" smtClean="0"/>
-              <a:t>9/14/2025</a:t>
+              <a:t>9/17/2025</a:t>
             </a:fld>
             <a:endParaRPr lang="en-US"/>
           </a:p>
@@ -763,7 +763,7 @@
           <a:p>
             <a:fld id="{0B7B8FCF-5140-490E-ADF7-11AFBA6DDAE6}" type="datetimeFigureOut">
               <a:rPr lang="en-US" smtClean="0"/>
-              <a:t>9/14/2025</a:t>
+              <a:t>9/17/2025</a:t>
             </a:fld>
             <a:endParaRPr lang="en-US"/>
           </a:p>
@@ -1009,7 +1009,7 @@
           <a:p>
             <a:fld id="{0B7B8FCF-5140-490E-ADF7-11AFBA6DDAE6}" type="datetimeFigureOut">
               <a:rPr lang="en-US" smtClean="0"/>
-              <a:t>9/14/2025</a:t>
+              <a:t>9/17/2025</a:t>
             </a:fld>
             <a:endParaRPr lang="en-US"/>
           </a:p>
@@ -1241,7 +1241,7 @@
           <a:p>
             <a:fld id="{0B7B8FCF-5140-490E-ADF7-11AFBA6DDAE6}" type="datetimeFigureOut">
               <a:rPr lang="en-US" smtClean="0"/>
-              <a:t>9/14/2025</a:t>
+              <a:t>9/17/2025</a:t>
             </a:fld>
             <a:endParaRPr lang="en-US"/>
           </a:p>
@@ -1608,7 +1608,7 @@
           <a:p>
             <a:fld id="{0B7B8FCF-5140-490E-ADF7-11AFBA6DDAE6}" type="datetimeFigureOut">
               <a:rPr lang="en-US" smtClean="0"/>
-              <a:t>9/14/2025</a:t>
+              <a:t>9/17/2025</a:t>
             </a:fld>
             <a:endParaRPr lang="en-US"/>
           </a:p>
@@ -1726,7 +1726,7 @@
           <a:p>
             <a:fld id="{0B7B8FCF-5140-490E-ADF7-11AFBA6DDAE6}" type="datetimeFigureOut">
               <a:rPr lang="en-US" smtClean="0"/>
-              <a:t>9/14/2025</a:t>
+              <a:t>9/17/2025</a:t>
             </a:fld>
             <a:endParaRPr lang="en-US"/>
           </a:p>
@@ -1821,7 +1821,7 @@
           <a:p>
             <a:fld id="{0B7B8FCF-5140-490E-ADF7-11AFBA6DDAE6}" type="datetimeFigureOut">
               <a:rPr lang="en-US" smtClean="0"/>
-              <a:t>9/14/2025</a:t>
+              <a:t>9/17/2025</a:t>
             </a:fld>
             <a:endParaRPr lang="en-US"/>
           </a:p>
@@ -2098,7 +2098,7 @@
           <a:p>
             <a:fld id="{0B7B8FCF-5140-490E-ADF7-11AFBA6DDAE6}" type="datetimeFigureOut">
               <a:rPr lang="en-US" smtClean="0"/>
-              <a:t>9/14/2025</a:t>
+              <a:t>9/17/2025</a:t>
             </a:fld>
             <a:endParaRPr lang="en-US"/>
           </a:p>
@@ -2355,7 +2355,7 @@
           <a:p>
             <a:fld id="{0B7B8FCF-5140-490E-ADF7-11AFBA6DDAE6}" type="datetimeFigureOut">
               <a:rPr lang="en-US" smtClean="0"/>
-              <a:t>9/14/2025</a:t>
+              <a:t>9/17/2025</a:t>
             </a:fld>
             <a:endParaRPr lang="en-US"/>
           </a:p>
@@ -2568,7 +2568,7 @@
           <a:p>
             <a:fld id="{0B7B8FCF-5140-490E-ADF7-11AFBA6DDAE6}" type="datetimeFigureOut">
               <a:rPr lang="en-US" smtClean="0"/>
-              <a:t>9/14/2025</a:t>
+              <a:t>9/17/2025</a:t>
             </a:fld>
             <a:endParaRPr lang="en-US"/>
           </a:p>
@@ -5073,8 +5073,8 @@
         </p:nvSpPr>
         <p:spPr>
           <a:xfrm>
-            <a:off x="1821839" y="6478636"/>
-            <a:ext cx="1015370" cy="337306"/>
+            <a:off x="1735245" y="6478636"/>
+            <a:ext cx="1182618" cy="516524"/>
           </a:xfrm>
           <a:prstGeom prst="roundRect">
             <a:avLst/>
@@ -5135,7 +5135,7 @@
                   </a:schemeClr>
                 </a:solidFill>
               </a:rPr>
-              <a:t>. E-Mail an Alle</a:t>
+              <a:t>. E-Mail an Student, Hochschulbetreuer und Dekanat</a:t>
             </a:r>
             <a:endParaRPr lang="en-US" sz="700" dirty="0">
               <a:solidFill>
@@ -5165,9 +5165,9 @@
           <p:nvPr/>
         </p:nvCxnSpPr>
         <p:spPr>
-          <a:xfrm>
-            <a:off x="2329524" y="6274960"/>
-            <a:ext cx="0" cy="203676"/>
+          <a:xfrm flipH="1">
+            <a:off x="2326554" y="6274960"/>
+            <a:ext cx="2970" cy="203676"/>
           </a:xfrm>
           <a:prstGeom prst="straightConnector1">
             <a:avLst/>

</xml_diff>